<commit_message>
adding lime, starting to work
</commit_message>
<xml_diff>
--- a/Understanding Bias Via Interpretability.pptx
+++ b/Understanding Bias Via Interpretability.pptx
@@ -63,6 +63,7 @@
     <p:sldId id="300" r:id="rId57"/>
     <p:sldId id="316" r:id="rId58"/>
     <p:sldId id="329" r:id="rId59"/>
+    <p:sldId id="330" r:id="rId60"/>
   </p:sldIdLst>
   <p:sldSz cx="12192000" cy="6858000"/>
   <p:notesSz cx="6858000" cy="9144000"/>
@@ -7887,7 +7888,22 @@
           <a:bodyPr/>
           <a:lstStyle/>
           <a:p>
-            <a:endParaRPr lang="en-US"/>
+            <a:r>
+              <a:rPr lang="en-US" dirty="0"/>
+              <a:t>Not a statistical test – therefore we don’t know how much to trust the feature importance</a:t>
+            </a:r>
+          </a:p>
+          <a:p>
+            <a:r>
+              <a:rPr lang="en-US" dirty="0"/>
+              <a:t>Must by couched in the semantics of what we are talking about!!!</a:t>
+            </a:r>
+          </a:p>
+          <a:p>
+            <a:r>
+              <a:rPr lang="en-US" dirty="0"/>
+              <a:t>Is often blindly accepted despite not considering the semantics!!!!</a:t>
+            </a:r>
           </a:p>
         </p:txBody>
       </p:sp>
@@ -7971,8 +7987,25 @@
           <a:lstStyle/>
           <a:p>
             <a:r>
-              <a:rPr lang="en-US" dirty="0"/>
+              <a:rPr lang="en-US" dirty="0">
+                <a:hlinkClick r:id="rId2"/>
+              </a:rPr>
               <a:t>https://scikit-learn.org/stable/modules/generated/sklearn.tree.export_graphviz.html</a:t>
+            </a:r>
+            <a:endParaRPr lang="en-US" dirty="0"/>
+          </a:p>
+          <a:p>
+            <a:r>
+              <a:rPr lang="en-US" dirty="0"/>
+              <a:t>See </a:t>
+            </a:r>
+            <a:r>
+              <a:rPr lang="en-US" dirty="0" err="1"/>
+              <a:t>jupyter</a:t>
+            </a:r>
+            <a:r>
+              <a:rPr lang="en-US" dirty="0"/>
+              <a:t> notebook</a:t>
             </a:r>
           </a:p>
         </p:txBody>
@@ -8976,7 +9009,7 @@
           <a:bodyPr/>
           <a:lstStyle/>
           <a:p>
-            <a:endParaRPr lang="en-US"/>
+            <a:endParaRPr lang="en-US" dirty="0"/>
           </a:p>
         </p:txBody>
       </p:sp>
@@ -10615,28 +10648,8 @@
           <a:p>
             <a:r>
               <a:rPr lang="en-US" dirty="0"/>
-              <a:t>College Acceptance Data - </a:t>
-            </a:r>
-            <a:r>
-              <a:rPr lang="en-US" dirty="0">
-                <a:hlinkClick r:id="rId3"/>
-              </a:rPr>
-              <a:t>https://collegescorecard.ed.gov/data/documentation/</a:t>
-            </a:r>
-            <a:endParaRPr lang="en-US" dirty="0"/>
-          </a:p>
-          <a:p>
-            <a:r>
-              <a:rPr lang="en-US" dirty="0"/>
-              <a:t>Police Data - </a:t>
-            </a:r>
-            <a:r>
-              <a:rPr lang="en-US" dirty="0">
-                <a:hlinkClick r:id="rId4"/>
-              </a:rPr>
-              <a:t>https://www.policedatainitiative.org/datasets/</a:t>
-            </a:r>
-            <a:endParaRPr lang="en-US" dirty="0"/>
+              <a:t>Police Shootings - https://www.kaggle.com/washingtonpost/police-shootings</a:t>
+            </a:r>
           </a:p>
         </p:txBody>
       </p:sp>
@@ -10720,9 +10733,33 @@
           <a:lstStyle/>
           <a:p>
             <a:r>
-              <a:rPr lang="en-US" dirty="0"/>
+              <a:rPr lang="en-US" dirty="0">
+                <a:hlinkClick r:id="rId2"/>
+              </a:rPr>
               <a:t>https://github.com/miguelgfierro/sciblog_support/blob/master/Dimensionality_Reduction_with_TSNE/dimensionality_reduction.ipynb</a:t>
             </a:r>
+            <a:endParaRPr lang="en-US" dirty="0"/>
+          </a:p>
+          <a:p>
+            <a:r>
+              <a:rPr lang="en-US" dirty="0">
+                <a:hlinkClick r:id="rId3"/>
+              </a:rPr>
+              <a:t>http://savvastjortjoglou.com/intrepretable-machine-learning-nfl-combine.html</a:t>
+            </a:r>
+            <a:endParaRPr lang="en-US" dirty="0"/>
+          </a:p>
+          <a:p>
+            <a:r>
+              <a:rPr lang="en-US" dirty="0">
+                <a:hlinkClick r:id="rId4"/>
+              </a:rPr>
+              <a:t>https://towardsdatascience.com/interpretable-machine-learning-with-xgboost-9ec80d148d27</a:t>
+            </a:r>
+            <a:endParaRPr lang="en-US" dirty="0"/>
+          </a:p>
+          <a:p>
+            <a:endParaRPr lang="en-US" dirty="0"/>
           </a:p>
         </p:txBody>
       </p:sp>
@@ -10809,7 +10846,7 @@
               <a:rPr lang="en-US" dirty="0">
                 <a:hlinkClick r:id="rId2"/>
               </a:rPr>
-              <a:t>https://www.kaggle.com/wsj/college-salaries#salaries-by-region.csv</a:t>
+              <a:t>https://www.kaggle.com/new-york-city/ny-police-civilian-encounters-leading-to-complaint</a:t>
             </a:r>
             <a:endParaRPr lang="en-US" dirty="0"/>
           </a:p>
@@ -10818,16 +10855,33 @@
               <a:rPr lang="en-US" dirty="0">
                 <a:hlinkClick r:id="rId3"/>
               </a:rPr>
-              <a:t>https://www.kaggle.com/new-york-city/ny-police-civilian-encounters-leading-to-complaint</a:t>
+              <a:t>https://www.kaggle.com/wsj/college-salaries</a:t>
             </a:r>
             <a:endParaRPr lang="en-US" dirty="0"/>
           </a:p>
           <a:p>
+            <a:r>
+              <a:rPr lang="en-US" dirty="0"/>
+              <a:t>College Acceptance Data - </a:t>
+            </a:r>
             <a:r>
               <a:rPr lang="en-US" dirty="0">
                 <a:hlinkClick r:id="rId4"/>
               </a:rPr>
-              <a:t>https://www.kaggle.com/wsj/college-salaries</a:t>
+              <a:t>https://collegescorecard.ed.gov/data/documentation/</a:t>
+            </a:r>
+            <a:endParaRPr lang="en-US" dirty="0"/>
+          </a:p>
+          <a:p>
+            <a:r>
+              <a:rPr lang="en-US" dirty="0"/>
+              <a:t>Police Data - </a:t>
+            </a:r>
+            <a:r>
+              <a:rPr lang="en-US" dirty="0">
+                <a:hlinkClick r:id="rId5"/>
+              </a:rPr>
+              <a:t>https://www.policedatainitiative.org/datasets/</a:t>
             </a:r>
             <a:endParaRPr lang="en-US" dirty="0"/>
           </a:p>
@@ -10840,6 +10894,92 @@
     <p:extLst>
       <p:ext uri="{BB962C8B-B14F-4D97-AF65-F5344CB8AC3E}">
         <p14:creationId xmlns:p14="http://schemas.microsoft.com/office/powerpoint/2010/main" val="2417144204"/>
+      </p:ext>
+    </p:extLst>
+  </p:cSld>
+  <p:clrMapOvr>
+    <a:masterClrMapping/>
+  </p:clrMapOvr>
+</p:sld>
+</file>
+
+<file path=ppt/slides/slide59.xml><?xml version="1.0" encoding="utf-8"?>
+<p:sld xmlns:a="http://schemas.openxmlformats.org/drawingml/2006/main" xmlns:r="http://schemas.openxmlformats.org/officeDocument/2006/relationships" xmlns:p="http://schemas.openxmlformats.org/presentationml/2006/main">
+  <p:cSld>
+    <p:spTree>
+      <p:nvGrpSpPr>
+        <p:cNvPr id="1" name=""/>
+        <p:cNvGrpSpPr/>
+        <p:nvPr/>
+      </p:nvGrpSpPr>
+      <p:grpSpPr>
+        <a:xfrm>
+          <a:off x="0" y="0"/>
+          <a:ext cx="0" cy="0"/>
+          <a:chOff x="0" y="0"/>
+          <a:chExt cx="0" cy="0"/>
+        </a:xfrm>
+      </p:grpSpPr>
+      <p:sp>
+        <p:nvSpPr>
+          <p:cNvPr id="2" name="Title 1">
+            <a:extLst>
+              <a:ext uri="{FF2B5EF4-FFF2-40B4-BE49-F238E27FC236}">
+                <a16:creationId xmlns:a16="http://schemas.microsoft.com/office/drawing/2014/main" id="{EBAE2C6D-ACC3-47F1-96A4-50C8FF5506CA}"/>
+              </a:ext>
+            </a:extLst>
+          </p:cNvPr>
+          <p:cNvSpPr>
+            <a:spLocks noGrp="1"/>
+          </p:cNvSpPr>
+          <p:nvPr>
+            <p:ph type="title"/>
+          </p:nvPr>
+        </p:nvSpPr>
+        <p:spPr/>
+        <p:txBody>
+          <a:bodyPr/>
+          <a:lstStyle/>
+          <a:p>
+            <a:r>
+              <a:rPr lang="en-US" dirty="0"/>
+              <a:t>Dangers</a:t>
+            </a:r>
+          </a:p>
+        </p:txBody>
+      </p:sp>
+      <p:sp>
+        <p:nvSpPr>
+          <p:cNvPr id="3" name="Content Placeholder 2">
+            <a:extLst>
+              <a:ext uri="{FF2B5EF4-FFF2-40B4-BE49-F238E27FC236}">
+                <a16:creationId xmlns:a16="http://schemas.microsoft.com/office/drawing/2014/main" id="{0762CDE2-3434-4E76-A478-3ED2CDCC53A5}"/>
+              </a:ext>
+            </a:extLst>
+          </p:cNvPr>
+          <p:cNvSpPr>
+            <a:spLocks noGrp="1"/>
+          </p:cNvSpPr>
+          <p:nvPr>
+            <p:ph idx="1"/>
+          </p:nvPr>
+        </p:nvSpPr>
+        <p:spPr/>
+        <p:txBody>
+          <a:bodyPr/>
+          <a:lstStyle/>
+          <a:p>
+            <a:r>
+              <a:rPr lang="en-US" dirty="0"/>
+              <a:t>https://stackoverflow.com/questions/48909418/lime-vs-treeinterpreter-for-interpreting-decision-tree</a:t>
+            </a:r>
+          </a:p>
+        </p:txBody>
+      </p:sp>
+    </p:spTree>
+    <p:extLst>
+      <p:ext uri="{BB962C8B-B14F-4D97-AF65-F5344CB8AC3E}">
+        <p14:creationId xmlns:p14="http://schemas.microsoft.com/office/powerpoint/2010/main" val="3034066987"/>
       </p:ext>
     </p:extLst>
   </p:cSld>
@@ -10894,8 +11034,8 @@
           </a:p>
         </p:txBody>
       </p:sp>
-      <mc:AlternateContent xmlns:mc="http://schemas.openxmlformats.org/markup-compatibility/2006" xmlns:a14="http://schemas.microsoft.com/office/drawing/2010/main">
-        <mc:Choice Requires="a14">
+      <mc:AlternateContent xmlns:mc="http://schemas.openxmlformats.org/markup-compatibility/2006">
+        <mc:Choice xmlns:a14="http://schemas.microsoft.com/office/drawing/2010/main" Requires="a14">
           <p:sp>
             <p:nvSpPr>
               <p:cNvPr id="3" name="Content Placeholder 2">
@@ -11003,7 +11143,7 @@
                 <a:pPr lvl="1"/>
                 <a:r>
                   <a:rPr lang="en-US" dirty="0"/>
-                  <a:t>Random Sampling (look this up)</a:t>
+                  <a:t>Random Sampling </a:t>
                 </a:r>
               </a:p>
               <a:p>
@@ -11184,7 +11324,7 @@
             </p:txBody>
           </p:sp>
         </mc:Choice>
-        <mc:Fallback xmlns="">
+        <mc:Fallback>
           <p:sp>
             <p:nvSpPr>
               <p:cNvPr id="3" name="Content Placeholder 2">
@@ -11203,7 +11343,7 @@
             </p:nvSpPr>
             <p:spPr>
               <a:blipFill>
-                <a:blip r:embed="rId5"/>
+                <a:blip r:embed="rId2"/>
                 <a:stretch>
                   <a:fillRect/>
                 </a:stretch>

</xml_diff>